<commit_message>
Small typing presentation updates
</commit_message>
<xml_diff>
--- a/Presentation/presentation_v2.pptx
+++ b/Presentation/presentation_v2.pptx
@@ -388,7 +388,7 @@
             <a:pPr indent="0" algn="r">
               <a:buNone/>
             </a:pPr>
-            <a:fld id="{9D558090-D610-43C0-872F-5622AE0832DB}" type="slidenum">
+            <a:fld id="{9920C7A8-8AE8-4FAF-A7B8-9901F91C131F}" type="slidenum">
               <a:rPr b="0" lang="en-GB" sz="1400" spc="-1" strike="noStrike">
                 <a:solidFill>
                   <a:srgbClr val="000000"/>
@@ -442,7 +442,7 @@
         <p:spPr>
           <a:xfrm>
             <a:off x="1371600" y="1143000"/>
-            <a:ext cx="4113360" cy="3084840"/>
+            <a:ext cx="4113000" cy="3084480"/>
           </a:xfrm>
           <a:prstGeom prst="rect">
             <a:avLst/>
@@ -465,7 +465,7 @@
         <p:spPr>
           <a:xfrm>
             <a:off x="685800" y="4400640"/>
-            <a:ext cx="5484960" cy="3598920"/>
+            <a:ext cx="5484600" cy="3598560"/>
           </a:xfrm>
           <a:prstGeom prst="rect">
             <a:avLst/>
@@ -505,7 +505,7 @@
         <p:spPr>
           <a:xfrm>
             <a:off x="3884760" y="8685360"/>
-            <a:ext cx="2970360" cy="457200"/>
+            <a:ext cx="2970000" cy="456840"/>
           </a:xfrm>
           <a:prstGeom prst="rect">
             <a:avLst/>
@@ -547,7 +547,7 @@
                 <a:tab algn="l" pos="0"/>
               </a:tabLst>
             </a:pPr>
-            <a:fld id="{0AB0E62D-0D5E-4C7D-98A7-262CA8C65159}" type="slidenum">
+            <a:fld id="{DEF62D8E-E747-423B-ABD5-FD56504273D0}" type="slidenum">
               <a:rPr b="0" lang="en-US" sz="1200" spc="-1" strike="noStrike">
                 <a:solidFill>
                   <a:srgbClr val="000000"/>
@@ -601,7 +601,7 @@
         <p:spPr>
           <a:xfrm>
             <a:off x="777240" y="4777560"/>
-            <a:ext cx="6216840" cy="4525200"/>
+            <a:ext cx="6216480" cy="4524840"/>
           </a:xfrm>
           <a:prstGeom prst="rect">
             <a:avLst/>
@@ -717,7 +717,7 @@
         <p:spPr>
           <a:xfrm>
             <a:off x="1371600" y="764280"/>
-            <a:ext cx="5027760" cy="3770640"/>
+            <a:ext cx="5027400" cy="3770280"/>
           </a:xfrm>
           <a:prstGeom prst="rect">
             <a:avLst/>
@@ -783,7 +783,7 @@
         <p:txBody>
           <a:bodyPr/>
           <a:p>
-            <a:fld id="{788D10EC-0036-4F91-B629-9DC68729EDDD}" type="slidenum">
+            <a:fld id="{098EB26A-DB0D-4A82-A777-055CD0FCD90D}" type="slidenum">
               <a:t>&lt;#&gt;</a:t>
             </a:fld>
           </a:p>
@@ -992,7 +992,7 @@
         <p:txBody>
           <a:bodyPr/>
           <a:p>
-            <a:fld id="{A662EB83-03C1-4717-A506-13E703665B24}" type="slidenum">
+            <a:fld id="{8A1E5421-299E-4E24-9B52-37DEE1D2E995}" type="slidenum">
               <a:t>&lt;#&gt;</a:t>
             </a:fld>
           </a:p>
@@ -1287,7 +1287,7 @@
         <p:txBody>
           <a:bodyPr/>
           <a:p>
-            <a:fld id="{5C953C2D-7C5C-43DB-8228-8DBC1310001F}" type="slidenum">
+            <a:fld id="{87D9940C-05F2-48E2-B678-1A7B22681C6F}" type="slidenum">
               <a:t>&lt;#&gt;</a:t>
             </a:fld>
           </a:p>
@@ -1668,7 +1668,7 @@
         <p:txBody>
           <a:bodyPr/>
           <a:p>
-            <a:fld id="{38FD1D3E-1A63-420A-8802-8D620CB3E965}" type="slidenum">
+            <a:fld id="{5316C6C7-1050-45D7-BF2B-0BAF1D2D3C35}" type="slidenum">
               <a:t>&lt;#&gt;</a:t>
             </a:fld>
           </a:p>
@@ -1751,7 +1751,7 @@
         <p:txBody>
           <a:bodyPr/>
           <a:p>
-            <a:fld id="{7F2FB1CE-CE38-4C52-B564-4A1C547DC40B}" type="slidenum">
+            <a:fld id="{E69A15B2-C9AC-4911-9983-7733E21008C2}" type="slidenum">
               <a:t>&lt;#&gt;</a:t>
             </a:fld>
           </a:p>
@@ -1914,7 +1914,7 @@
         <p:txBody>
           <a:bodyPr/>
           <a:p>
-            <a:fld id="{3B8CDC32-A723-47D7-8F20-1338320055E1}" type="slidenum">
+            <a:fld id="{EF9AB137-218E-4F78-840B-A8F44530B6FF}" type="slidenum">
               <a:t>&lt;#&gt;</a:t>
             </a:fld>
           </a:p>
@@ -2080,7 +2080,7 @@
         <p:txBody>
           <a:bodyPr/>
           <a:p>
-            <a:fld id="{E6AA1310-62B9-4552-ADE6-DB3CF824BDA3}" type="slidenum">
+            <a:fld id="{2D30C294-D091-413E-909C-A98874AB0499}" type="slidenum">
               <a:t>&lt;#&gt;</a:t>
             </a:fld>
           </a:p>
@@ -2289,7 +2289,7 @@
         <p:txBody>
           <a:bodyPr/>
           <a:p>
-            <a:fld id="{52C945C3-F949-43F6-970D-771A68C6A9C1}" type="slidenum">
+            <a:fld id="{7CC2F77E-C013-4BB5-92CF-DB2580665D0B}" type="slidenum">
               <a:t>&lt;#&gt;</a:t>
             </a:fld>
           </a:p>
@@ -2412,7 +2412,7 @@
         <p:txBody>
           <a:bodyPr/>
           <a:p>
-            <a:fld id="{0707DB6A-524C-4BA4-B5A6-CC81B5587155}" type="slidenum">
+            <a:fld id="{B2401BB3-3AFC-4CDF-9FDE-675491FF2C99}" type="slidenum">
               <a:t>&lt;#&gt;</a:t>
             </a:fld>
           </a:p>
@@ -2533,7 +2533,7 @@
         <p:txBody>
           <a:bodyPr/>
           <a:p>
-            <a:fld id="{B2340D27-4D09-4055-94B9-0B6380F93DCD}" type="slidenum">
+            <a:fld id="{275618E6-DE2E-4942-83CB-ED87FBF2076E}" type="slidenum">
               <a:t>&lt;#&gt;</a:t>
             </a:fld>
           </a:p>
@@ -2785,7 +2785,7 @@
         <p:txBody>
           <a:bodyPr/>
           <a:p>
-            <a:fld id="{6DF794B5-D710-4A1A-8DE4-480BB89E3919}" type="slidenum">
+            <a:fld id="{25F21F57-86AC-4268-BEF6-FD222F5FC9BA}" type="slidenum">
               <a:t>&lt;#&gt;</a:t>
             </a:fld>
           </a:p>
@@ -2948,7 +2948,7 @@
         <p:txBody>
           <a:bodyPr/>
           <a:p>
-            <a:fld id="{62315AAF-E7CB-4B0D-846D-055EEB3199AB}" type="slidenum">
+            <a:fld id="{CA9EE77C-4401-41E0-A521-DAE4C784D2C4}" type="slidenum">
               <a:t>&lt;#&gt;</a:t>
             </a:fld>
           </a:p>
@@ -3200,7 +3200,7 @@
         <p:txBody>
           <a:bodyPr/>
           <a:p>
-            <a:fld id="{57F1B761-900D-41F3-A804-4230C8F659D8}" type="slidenum">
+            <a:fld id="{7B26D28A-306E-480A-9159-E63ED0EE4F27}" type="slidenum">
               <a:t>&lt;#&gt;</a:t>
             </a:fld>
           </a:p>
@@ -3452,7 +3452,7 @@
         <p:txBody>
           <a:bodyPr/>
           <a:p>
-            <a:fld id="{AE362ADF-314D-437B-B576-FAAE1226F007}" type="slidenum">
+            <a:fld id="{F8683716-27BD-4562-9AC2-977743704004}" type="slidenum">
               <a:t>&lt;#&gt;</a:t>
             </a:fld>
           </a:p>
@@ -3661,7 +3661,7 @@
         <p:txBody>
           <a:bodyPr/>
           <a:p>
-            <a:fld id="{E636DE8C-6DE8-4CF3-86DC-D992A2E1A198}" type="slidenum">
+            <a:fld id="{D6579562-16BF-40C9-970E-6037ADB5A6E2}" type="slidenum">
               <a:t>&lt;#&gt;</a:t>
             </a:fld>
           </a:p>
@@ -3956,7 +3956,7 @@
         <p:txBody>
           <a:bodyPr/>
           <a:p>
-            <a:fld id="{422CDDDB-9604-4FDC-9012-4B8C7BA6BA19}" type="slidenum">
+            <a:fld id="{9217EA1C-5099-4CD6-B226-BF46EED9D151}" type="slidenum">
               <a:t>&lt;#&gt;</a:t>
             </a:fld>
           </a:p>
@@ -4337,7 +4337,7 @@
         <p:txBody>
           <a:bodyPr/>
           <a:p>
-            <a:fld id="{52922166-3796-4462-8AAB-709705422D6D}" type="slidenum">
+            <a:fld id="{856C52C9-8323-4DF3-8111-9125646BD3AB}" type="slidenum">
               <a:t>&lt;#&gt;</a:t>
             </a:fld>
           </a:p>
@@ -4420,7 +4420,7 @@
         <p:txBody>
           <a:bodyPr/>
           <a:p>
-            <a:fld id="{1D2E7658-25FF-4294-80C4-98287917377E}" type="slidenum">
+            <a:fld id="{F91AECDB-1730-48F0-AEB7-173BB223FB95}" type="slidenum">
               <a:t>&lt;#&gt;</a:t>
             </a:fld>
           </a:p>
@@ -4583,7 +4583,7 @@
         <p:txBody>
           <a:bodyPr/>
           <a:p>
-            <a:fld id="{96C3253A-BA68-4E98-9533-2D4C11EA9B2E}" type="slidenum">
+            <a:fld id="{1EE81917-51B7-4274-854B-805EA567838E}" type="slidenum">
               <a:t>&lt;#&gt;</a:t>
             </a:fld>
           </a:p>
@@ -4749,7 +4749,7 @@
         <p:txBody>
           <a:bodyPr/>
           <a:p>
-            <a:fld id="{ED70B1CF-D2AD-42E7-8FE0-BB56A066BC06}" type="slidenum">
+            <a:fld id="{E35C352A-A6AB-4B0C-980A-CBD245852C50}" type="slidenum">
               <a:t>&lt;#&gt;</a:t>
             </a:fld>
           </a:p>
@@ -4958,7 +4958,7 @@
         <p:txBody>
           <a:bodyPr/>
           <a:p>
-            <a:fld id="{D4ECBDD1-E16F-4B98-94BF-781DE6E85738}" type="slidenum">
+            <a:fld id="{4485AEA3-916E-4F49-B1A5-34A2FC2BFC1F}" type="slidenum">
               <a:t>&lt;#&gt;</a:t>
             </a:fld>
           </a:p>
@@ -5081,7 +5081,7 @@
         <p:txBody>
           <a:bodyPr/>
           <a:p>
-            <a:fld id="{8E9E1FB9-694C-4208-B79A-44C2D8CD9EF4}" type="slidenum">
+            <a:fld id="{417BABF5-F373-43B1-B963-04B6172975EF}" type="slidenum">
               <a:t>&lt;#&gt;</a:t>
             </a:fld>
           </a:p>
@@ -5247,7 +5247,7 @@
         <p:txBody>
           <a:bodyPr/>
           <a:p>
-            <a:fld id="{C9E8AA51-F666-4F08-97BE-0551B6CE8E31}" type="slidenum">
+            <a:fld id="{5270242F-011E-4E79-8A66-EB623643CD11}" type="slidenum">
               <a:t>&lt;#&gt;</a:t>
             </a:fld>
           </a:p>
@@ -5368,7 +5368,7 @@
         <p:txBody>
           <a:bodyPr/>
           <a:p>
-            <a:fld id="{1C7E4AC1-9CBB-49B1-ADC3-37F3A52F1299}" type="slidenum">
+            <a:fld id="{961D09C8-8B5D-418C-8CB0-46FA3B5375F6}" type="slidenum">
               <a:t>&lt;#&gt;</a:t>
             </a:fld>
           </a:p>
@@ -5620,7 +5620,7 @@
         <p:txBody>
           <a:bodyPr/>
           <a:p>
-            <a:fld id="{2A8E6F3A-D49D-42C9-B657-6F4EE2C581F7}" type="slidenum">
+            <a:fld id="{6457D53D-ADDB-4132-AAE5-04449FC2D6A0}" type="slidenum">
               <a:t>&lt;#&gt;</a:t>
             </a:fld>
           </a:p>
@@ -5872,7 +5872,7 @@
         <p:txBody>
           <a:bodyPr/>
           <a:p>
-            <a:fld id="{5E201C50-7ABE-41D7-A741-86BF82DE5B43}" type="slidenum">
+            <a:fld id="{65DE8A3A-E86F-475F-912A-35FA4C5F6ACB}" type="slidenum">
               <a:t>&lt;#&gt;</a:t>
             </a:fld>
           </a:p>
@@ -6124,7 +6124,7 @@
         <p:txBody>
           <a:bodyPr/>
           <a:p>
-            <a:fld id="{620110F3-3FD3-4DA5-A04F-154FE103F92A}" type="slidenum">
+            <a:fld id="{BB567310-7F88-4D33-9F59-007974F7A50D}" type="slidenum">
               <a:t>&lt;#&gt;</a:t>
             </a:fld>
           </a:p>
@@ -6333,7 +6333,7 @@
         <p:txBody>
           <a:bodyPr/>
           <a:p>
-            <a:fld id="{0FEC886E-C8A2-45AF-8902-2EF550D0785A}" type="slidenum">
+            <a:fld id="{65A4A6EB-8BA2-44AC-AE72-EA3385E9F3E8}" type="slidenum">
               <a:t>&lt;#&gt;</a:t>
             </a:fld>
           </a:p>
@@ -6628,7 +6628,7 @@
         <p:txBody>
           <a:bodyPr/>
           <a:p>
-            <a:fld id="{54E3BCA3-3A4A-4D87-8AC4-5A167159ADC7}" type="slidenum">
+            <a:fld id="{A9DBAB00-D3DA-4257-9D9D-519D194A461C}" type="slidenum">
               <a:t>&lt;#&gt;</a:t>
             </a:fld>
           </a:p>
@@ -7009,7 +7009,7 @@
         <p:txBody>
           <a:bodyPr/>
           <a:p>
-            <a:fld id="{FC9671AC-EE24-4786-9FCC-4CC5478F8983}" type="slidenum">
+            <a:fld id="{D7DFB67D-3D88-4111-8AE7-974FBEAE1EE6}" type="slidenum">
               <a:t>&lt;#&gt;</a:t>
             </a:fld>
           </a:p>
@@ -7447,7 +7447,7 @@
         <p:txBody>
           <a:bodyPr/>
           <a:p>
-            <a:fld id="{B3E7F3D1-11C7-4005-AC4F-25AE9CA3E059}" type="slidenum">
+            <a:fld id="{D584B679-ADBF-4FB1-96C3-A21672CAA96B}" type="slidenum">
               <a:t>&lt;#&gt;</a:t>
             </a:fld>
           </a:p>
@@ -9115,7 +9115,7 @@
         <p:txBody>
           <a:bodyPr/>
           <a:p>
-            <a:fld id="{30364F51-5F49-4E08-86C0-25B15C416B2F}" type="slidenum">
+            <a:fld id="{42B37493-8EC2-4AEB-992E-61158455253C}" type="slidenum">
               <a:t>&lt;#&gt;</a:t>
             </a:fld>
           </a:p>
@@ -9236,7 +9236,7 @@
         <p:txBody>
           <a:bodyPr/>
           <a:p>
-            <a:fld id="{C8193FC4-7958-43B2-A332-5C89F58F06C5}" type="slidenum">
+            <a:fld id="{DEFFBEFD-4845-4812-999D-276E09D6D8FC}" type="slidenum">
               <a:t>&lt;#&gt;</a:t>
             </a:fld>
           </a:p>
@@ -9488,7 +9488,7 @@
         <p:txBody>
           <a:bodyPr/>
           <a:p>
-            <a:fld id="{A024AF16-418B-4F57-A5D5-A035E62060B1}" type="slidenum">
+            <a:fld id="{F77F8E69-A5DB-4F0E-A18D-D841FA1C20CD}" type="slidenum">
               <a:t>&lt;#&gt;</a:t>
             </a:fld>
           </a:p>
@@ -9740,7 +9740,7 @@
         <p:txBody>
           <a:bodyPr/>
           <a:p>
-            <a:fld id="{58F9DC0E-67CB-4605-823C-DBD8321D7392}" type="slidenum">
+            <a:fld id="{DE952AC5-64C3-4B3D-BEAE-9369D6E64E38}" type="slidenum">
               <a:t>&lt;#&gt;</a:t>
             </a:fld>
           </a:p>
@@ -9992,7 +9992,7 @@
         <p:txBody>
           <a:bodyPr/>
           <a:p>
-            <a:fld id="{C28435E0-4EB8-409B-A344-5A6A2226D2E0}" type="slidenum">
+            <a:fld id="{8ACB9E6E-549B-4FF1-9D99-836F745CA5DD}" type="slidenum">
               <a:t>&lt;#&gt;</a:t>
             </a:fld>
           </a:p>
@@ -10057,7 +10057,7 @@
         <p:spPr>
           <a:xfrm>
             <a:off x="8574480" y="6409800"/>
-            <a:ext cx="1440" cy="168120"/>
+            <a:ext cx="1800" cy="168480"/>
           </a:xfrm>
           <a:prstGeom prst="straightConnector1">
             <a:avLst/>
@@ -10083,7 +10083,7 @@
         <p:spPr>
           <a:xfrm>
             <a:off x="316800" y="6202440"/>
-            <a:ext cx="1211400" cy="433440"/>
+            <a:ext cx="1211040" cy="433080"/>
           </a:xfrm>
           <a:prstGeom prst="rect">
             <a:avLst/>
@@ -10131,7 +10131,16 @@
                 </a:solidFill>
                 <a:latin typeface="Arial"/>
               </a:rPr>
-              <a:t>Click to edit the title text format</a:t>
+              <a:t>Click to edit the </a:t>
+            </a:r>
+            <a:r>
+              <a:rPr b="0" lang="en-GB" sz="1800" spc="-1" strike="noStrike">
+                <a:solidFill>
+                  <a:srgbClr val="000000"/>
+                </a:solidFill>
+                <a:latin typeface="Arial"/>
+              </a:rPr>
+              <a:t>title text format</a:t>
             </a:r>
             <a:endParaRPr b="0" lang="en-GB" sz="1800" spc="-1" strike="noStrike">
               <a:solidFill>
@@ -10155,7 +10164,7 @@
         <p:spPr>
           <a:xfrm>
             <a:off x="2845800" y="6388200"/>
-            <a:ext cx="3450960" cy="281520"/>
+            <a:ext cx="3450600" cy="281160"/>
           </a:xfrm>
           <a:prstGeom prst="rect">
             <a:avLst/>
@@ -10203,7 +10212,7 @@
                 </a:solidFill>
                 <a:latin typeface="Times New Roman"/>
               </a:rPr>
-              <a:t> </a:t>
+              <a:t>&lt;footer&gt;</a:t>
             </a:r>
             <a:endParaRPr b="0" lang="en-GB" sz="1400" spc="-1" strike="noStrike">
               <a:solidFill>
@@ -10227,7 +10236,7 @@
         <p:spPr>
           <a:xfrm>
             <a:off x="8670600" y="6388200"/>
-            <a:ext cx="326160" cy="281520"/>
+            <a:ext cx="325800" cy="281160"/>
           </a:xfrm>
           <a:prstGeom prst="rect">
             <a:avLst/>
@@ -10269,7 +10278,7 @@
                 <a:tab algn="l" pos="0"/>
               </a:tabLst>
             </a:pPr>
-            <a:fld id="{FA23171D-7F62-4E54-806B-69EF61B5268D}" type="slidenum">
+            <a:fld id="{84776A0E-B0F7-4054-AF23-1D1360DAAC4E}" type="slidenum">
               <a:rPr b="0" lang="en-US" sz="800" spc="-1" strike="noStrike">
                 <a:solidFill>
                   <a:srgbClr val="595959"/>
@@ -10277,7 +10286,7 @@
                 <a:latin typeface="Arial"/>
                 <a:ea typeface="Arial"/>
               </a:rPr>
-              <a:t>8</a:t>
+              <a:t>&lt;number&gt;</a:t>
             </a:fld>
             <a:endParaRPr b="0" lang="en-GB" sz="800" spc="-1" strike="noStrike">
               <a:solidFill>
@@ -10301,7 +10310,7 @@
         <p:spPr>
           <a:xfrm>
             <a:off x="1891080" y="6388200"/>
-            <a:ext cx="793440" cy="281520"/>
+            <a:ext cx="793080" cy="281160"/>
           </a:xfrm>
           <a:prstGeom prst="rect">
             <a:avLst/>
@@ -10337,7 +10346,7 @@
                 </a:solidFill>
                 <a:latin typeface="Times New Roman"/>
               </a:rPr>
-              <a:t> </a:t>
+              <a:t>&lt;date/time&gt;</a:t>
             </a:r>
             <a:endParaRPr b="0" lang="en-GB" sz="1400" spc="-1" strike="noStrike">
               <a:solidFill>
@@ -10626,7 +10635,7 @@
         <p:spPr>
           <a:xfrm>
             <a:off x="8574480" y="6409800"/>
-            <a:ext cx="1440" cy="168120"/>
+            <a:ext cx="1800" cy="168480"/>
           </a:xfrm>
           <a:prstGeom prst="straightConnector1">
             <a:avLst/>
@@ -10652,7 +10661,7 @@
         <p:spPr>
           <a:xfrm>
             <a:off x="316800" y="6202440"/>
-            <a:ext cx="1211400" cy="433440"/>
+            <a:ext cx="1211040" cy="433080"/>
           </a:xfrm>
           <a:prstGeom prst="rect">
             <a:avLst/>
@@ -10675,7 +10684,7 @@
         <p:spPr>
           <a:xfrm>
             <a:off x="2845800" y="6388200"/>
-            <a:ext cx="3450960" cy="281520"/>
+            <a:ext cx="3450600" cy="281160"/>
           </a:xfrm>
           <a:prstGeom prst="rect">
             <a:avLst/>
@@ -10747,7 +10756,7 @@
         <p:spPr>
           <a:xfrm>
             <a:off x="8670600" y="6388200"/>
-            <a:ext cx="326160" cy="281520"/>
+            <a:ext cx="325800" cy="281160"/>
           </a:xfrm>
           <a:prstGeom prst="rect">
             <a:avLst/>
@@ -10789,7 +10798,7 @@
                 <a:tab algn="l" pos="0"/>
               </a:tabLst>
             </a:pPr>
-            <a:fld id="{C977F663-2DC8-4362-8C28-58D0168EFFB6}" type="slidenum">
+            <a:fld id="{EA034C83-5201-44B9-A222-9115D8BD8F35}" type="slidenum">
               <a:rPr b="0" lang="en-US" sz="800" spc="-1" strike="noStrike">
                 <a:solidFill>
                   <a:srgbClr val="595959"/>
@@ -10821,7 +10830,7 @@
         <p:spPr>
           <a:xfrm>
             <a:off x="1891080" y="6388200"/>
-            <a:ext cx="793440" cy="281520"/>
+            <a:ext cx="793080" cy="281160"/>
           </a:xfrm>
           <a:prstGeom prst="rect">
             <a:avLst/>
@@ -11195,7 +11204,7 @@
         <p:spPr>
           <a:xfrm>
             <a:off x="8574480" y="6409800"/>
-            <a:ext cx="1440" cy="168120"/>
+            <a:ext cx="1800" cy="168480"/>
           </a:xfrm>
           <a:prstGeom prst="straightConnector1">
             <a:avLst/>
@@ -11221,7 +11230,7 @@
         <p:spPr>
           <a:xfrm>
             <a:off x="316800" y="6202440"/>
-            <a:ext cx="1211400" cy="433440"/>
+            <a:ext cx="1211040" cy="433080"/>
           </a:xfrm>
           <a:prstGeom prst="rect">
             <a:avLst/>
@@ -11244,7 +11253,7 @@
         <p:spPr>
           <a:xfrm>
             <a:off x="2845800" y="6388200"/>
-            <a:ext cx="3450960" cy="281520"/>
+            <a:ext cx="3450600" cy="281160"/>
           </a:xfrm>
           <a:prstGeom prst="rect">
             <a:avLst/>
@@ -11316,7 +11325,7 @@
         <p:spPr>
           <a:xfrm>
             <a:off x="8670600" y="6388200"/>
-            <a:ext cx="326160" cy="281520"/>
+            <a:ext cx="325800" cy="281160"/>
           </a:xfrm>
           <a:prstGeom prst="rect">
             <a:avLst/>
@@ -11358,7 +11367,7 @@
                 <a:tab algn="l" pos="0"/>
               </a:tabLst>
             </a:pPr>
-            <a:fld id="{B25D773A-7977-43DA-BE09-CF46F7A21F68}" type="slidenum">
+            <a:fld id="{E73C2024-F029-4D7B-96DD-37F6C2B68C98}" type="slidenum">
               <a:rPr b="0" lang="en-US" sz="800" spc="-1" strike="noStrike">
                 <a:solidFill>
                   <a:srgbClr val="595959"/>
@@ -11390,7 +11399,7 @@
         <p:spPr>
           <a:xfrm>
             <a:off x="1891080" y="6388200"/>
-            <a:ext cx="793440" cy="281520"/>
+            <a:ext cx="793080" cy="281160"/>
           </a:xfrm>
           <a:prstGeom prst="rect">
             <a:avLst/>
@@ -11764,7 +11773,7 @@
         <p:spPr>
           <a:xfrm>
             <a:off x="8574480" y="6409800"/>
-            <a:ext cx="1080" cy="167760"/>
+            <a:ext cx="1440" cy="168120"/>
           </a:xfrm>
           <a:prstGeom prst="straightConnector1">
             <a:avLst/>
@@ -11790,7 +11799,7 @@
         <p:spPr>
           <a:xfrm>
             <a:off x="316800" y="6202440"/>
-            <a:ext cx="1211760" cy="433800"/>
+            <a:ext cx="1211400" cy="433440"/>
           </a:xfrm>
           <a:prstGeom prst="rect">
             <a:avLst/>
@@ -11813,7 +11822,7 @@
         <p:spPr>
           <a:xfrm>
             <a:off x="0" y="0"/>
-            <a:ext cx="9142920" cy="6856920"/>
+            <a:ext cx="9142560" cy="6856560"/>
           </a:xfrm>
           <a:prstGeom prst="rect">
             <a:avLst/>
@@ -11836,7 +11845,7 @@
         <p:spPr>
           <a:xfrm>
             <a:off x="408240" y="5543640"/>
-            <a:ext cx="2123280" cy="761040"/>
+            <a:ext cx="2122920" cy="760680"/>
           </a:xfrm>
           <a:prstGeom prst="rect">
             <a:avLst/>
@@ -12170,7 +12179,7 @@
         <p:spPr>
           <a:xfrm>
             <a:off x="540000" y="360000"/>
-            <a:ext cx="8228520" cy="1530000"/>
+            <a:ext cx="8228160" cy="1529640"/>
           </a:xfrm>
           <a:prstGeom prst="rect">
             <a:avLst/>
@@ -12222,7 +12231,7 @@
         <p:spPr>
           <a:xfrm>
             <a:off x="540000" y="1999440"/>
-            <a:ext cx="7266600" cy="2810880"/>
+            <a:ext cx="7266240" cy="2810520"/>
           </a:xfrm>
           <a:prstGeom prst="rect">
             <a:avLst/>
@@ -12440,7 +12449,7 @@
         <p:spPr>
           <a:xfrm>
             <a:off x="4699080" y="3312000"/>
-            <a:ext cx="4096800" cy="3558960"/>
+            <a:ext cx="4096440" cy="3558600"/>
           </a:xfrm>
           <a:prstGeom prst="rect">
             <a:avLst/>
@@ -12463,7 +12472,7 @@
         <p:spPr>
           <a:xfrm>
             <a:off x="8670600" y="6388200"/>
-            <a:ext cx="326160" cy="281520"/>
+            <a:ext cx="325800" cy="281160"/>
           </a:xfrm>
           <a:prstGeom prst="rect">
             <a:avLst/>
@@ -12505,7 +12514,7 @@
                 <a:tab algn="l" pos="0"/>
               </a:tabLst>
             </a:pPr>
-            <a:fld id="{51B25CC2-AFAA-40C4-8CC9-5FB8F563414C}" type="slidenum">
+            <a:fld id="{747FDE37-98E8-4CB5-83E8-1CE2ACB175F9}" type="slidenum">
               <a:rPr b="0" lang="en-US" sz="800" spc="-1" strike="noStrike">
                 <a:solidFill>
                   <a:srgbClr val="595959"/>
@@ -12538,7 +12547,7 @@
 </file>
 
 <file path=ppt/slides/slide10.xml><?xml version="1.0" encoding="utf-8"?>
-<p:sld xmlns:a="http://schemas.openxmlformats.org/drawingml/2006/main" xmlns:p="http://schemas.openxmlformats.org/presentationml/2006/main" xmlns:r="http://schemas.openxmlformats.org/officeDocument/2006/relationships" xmlns:p14="http://schemas.microsoft.com/office/powerpoint/2010/main" xmlns:p15="http://schemas.microsoft.com/office/powerpoint/2012/main" xmlns:mc="http://schemas.openxmlformats.org/markup-compatibility/2006">
+<p:sld xmlns:a="http://schemas.openxmlformats.org/drawingml/2006/main" xmlns:p="http://schemas.openxmlformats.org/presentationml/2006/main" xmlns:r="http://schemas.openxmlformats.org/officeDocument/2006/relationships" xmlns:p14="http://schemas.microsoft.com/office/powerpoint/2010/main" xmlns:p15="http://schemas.microsoft.com/office/powerpoint/2012/main" xmlns:mc="http://schemas.openxmlformats.org/markup-compatibility/2006" show="0">
   <p:cSld>
     <p:spTree>
       <p:nvGrpSpPr>
@@ -12567,7 +12576,7 @@
         <p:spPr>
           <a:xfrm>
             <a:off x="630000" y="215280"/>
-            <a:ext cx="8228520" cy="1144080"/>
+            <a:ext cx="8228160" cy="1143720"/>
           </a:xfrm>
           <a:prstGeom prst="rect">
             <a:avLst/>
@@ -12623,7 +12632,7 @@
         <p:spPr>
           <a:xfrm>
             <a:off x="8670600" y="6388200"/>
-            <a:ext cx="326160" cy="281520"/>
+            <a:ext cx="325800" cy="281160"/>
           </a:xfrm>
           <a:prstGeom prst="rect">
             <a:avLst/>
@@ -12665,7 +12674,7 @@
                 <a:tab algn="l" pos="0"/>
               </a:tabLst>
             </a:pPr>
-            <a:fld id="{A9B4C4D0-9553-4D89-96B8-D90ED37E9BDD}" type="slidenum">
+            <a:fld id="{20A063DD-BCC0-4962-B4D1-BFB34C05EF02}" type="slidenum">
               <a:rPr b="0" lang="en-US" sz="800" spc="-1" strike="noStrike">
                 <a:solidFill>
                   <a:srgbClr val="595959"/>
@@ -12673,7 +12682,7 @@
                 <a:latin typeface="Arial"/>
                 <a:ea typeface="Arial"/>
               </a:rPr>
-              <a:t>5</a:t>
+              <a:t>&lt;number&gt;</a:t>
             </a:fld>
             <a:endParaRPr b="0" lang="en-GB" sz="800" spc="-1" strike="noStrike">
               <a:solidFill>
@@ -12693,7 +12702,7 @@
         <p:spPr>
           <a:xfrm>
             <a:off x="630000" y="2052360"/>
-            <a:ext cx="8039880" cy="399600"/>
+            <a:ext cx="8039520" cy="399240"/>
           </a:xfrm>
           <a:prstGeom prst="rect">
             <a:avLst/>
@@ -13006,8 +13015,8 @@
         </p:nvSpPr>
         <p:spPr>
           <a:xfrm>
-            <a:off x="847080" y="4463280"/>
-            <a:ext cx="7178400" cy="410760"/>
+            <a:off x="847080" y="4462920"/>
+            <a:ext cx="7178040" cy="410760"/>
           </a:xfrm>
           <a:prstGeom prst="rect">
             <a:avLst/>
@@ -13098,7 +13107,7 @@
         <p:spPr>
           <a:xfrm>
             <a:off x="8670600" y="6388200"/>
-            <a:ext cx="326160" cy="281520"/>
+            <a:ext cx="325800" cy="281160"/>
           </a:xfrm>
           <a:prstGeom prst="rect">
             <a:avLst/>
@@ -13140,7 +13149,7 @@
                 <a:tab algn="l" pos="0"/>
               </a:tabLst>
             </a:pPr>
-            <a:fld id="{F1182967-4CC4-4C20-9325-00845D0806B3}" type="slidenum">
+            <a:fld id="{6F97F469-9DD5-48AB-9758-F4838A135DEF}" type="slidenum">
               <a:rPr b="0" lang="en-US" sz="800" spc="-1" strike="noStrike">
                 <a:solidFill>
                   <a:srgbClr val="595959"/>
@@ -13148,7 +13157,7 @@
                 <a:latin typeface="Arial"/>
                 <a:ea typeface="Arial"/>
               </a:rPr>
-              <a:t>5</a:t>
+              <a:t>&lt;number&gt;</a:t>
             </a:fld>
             <a:endParaRPr b="0" lang="en-GB" sz="800" spc="-1" strike="noStrike">
               <a:solidFill>
@@ -13168,7 +13177,7 @@
         <p:spPr>
           <a:xfrm>
             <a:off x="630000" y="2052360"/>
-            <a:ext cx="8039880" cy="399600"/>
+            <a:ext cx="8039520" cy="399240"/>
           </a:xfrm>
           <a:prstGeom prst="rect">
             <a:avLst/>
@@ -14512,8 +14521,8 @@
         </p:nvSpPr>
         <p:spPr>
           <a:xfrm>
-            <a:off x="829440" y="5673960"/>
-            <a:ext cx="7178400" cy="410760"/>
+            <a:off x="829440" y="5673600"/>
+            <a:ext cx="7178040" cy="410760"/>
           </a:xfrm>
           <a:prstGeom prst="rect">
             <a:avLst/>
@@ -14604,7 +14613,7 @@
         <p:spPr>
           <a:xfrm>
             <a:off x="457200" y="1604520"/>
-            <a:ext cx="8228520" cy="3976560"/>
+            <a:ext cx="8228160" cy="3976200"/>
           </a:xfrm>
           <a:prstGeom prst="rect">
             <a:avLst/>
@@ -14879,7 +14888,7 @@
         <p:spPr>
           <a:xfrm>
             <a:off x="457200" y="273600"/>
-            <a:ext cx="8228520" cy="1144080"/>
+            <a:ext cx="8228160" cy="1143720"/>
           </a:xfrm>
           <a:prstGeom prst="rect">
             <a:avLst/>
@@ -14935,7 +14944,7 @@
         <p:spPr>
           <a:xfrm>
             <a:off x="8670600" y="6388200"/>
-            <a:ext cx="326160" cy="281520"/>
+            <a:ext cx="325800" cy="281160"/>
           </a:xfrm>
           <a:prstGeom prst="rect">
             <a:avLst/>
@@ -14977,7 +14986,7 @@
                 <a:tab algn="l" pos="0"/>
               </a:tabLst>
             </a:pPr>
-            <a:fld id="{872AD532-5AE2-4F0E-816B-ACC008587436}" type="slidenum">
+            <a:fld id="{B7C6E2D0-59BF-40C4-B7B1-4FBF4037E8BD}" type="slidenum">
               <a:rPr b="0" lang="en-US" sz="800" spc="-1" strike="noStrike">
                 <a:solidFill>
                   <a:srgbClr val="595959"/>
@@ -14985,7 +14994,7 @@
                 <a:latin typeface="Arial"/>
                 <a:ea typeface="Arial"/>
               </a:rPr>
-              <a:t>5</a:t>
+              <a:t>&lt;number&gt;</a:t>
             </a:fld>
             <a:endParaRPr b="0" lang="en-GB" sz="800" spc="-1" strike="noStrike">
               <a:solidFill>
@@ -15039,7 +15048,7 @@
         <p:spPr>
           <a:xfrm>
             <a:off x="314640" y="1171080"/>
-            <a:ext cx="3600360" cy="2400480"/>
+            <a:ext cx="3600000" cy="2400120"/>
           </a:xfrm>
           <a:prstGeom prst="rect">
             <a:avLst/>
@@ -15114,7 +15123,7 @@
         <p:spPr>
           <a:xfrm>
             <a:off x="8670600" y="6388200"/>
-            <a:ext cx="326520" cy="281880"/>
+            <a:ext cx="326160" cy="281520"/>
           </a:xfrm>
           <a:prstGeom prst="rect">
             <a:avLst/>
@@ -15156,7 +15165,7 @@
                 <a:tab algn="l" pos="0"/>
               </a:tabLst>
             </a:pPr>
-            <a:fld id="{87A13C76-4AD8-4A05-B9FC-F6E731AECE6B}" type="slidenum">
+            <a:fld id="{EE44D644-D968-4CFE-9D66-485576D2CB99}" type="slidenum">
               <a:rPr b="0" lang="en-US" sz="800" spc="-1" strike="noStrike">
                 <a:solidFill>
                   <a:srgbClr val="595959"/>
@@ -15218,7 +15227,7 @@
         <p:spPr>
           <a:xfrm>
             <a:off x="316800" y="1452240"/>
-            <a:ext cx="3806640" cy="4552200"/>
+            <a:ext cx="3806280" cy="4551840"/>
           </a:xfrm>
           <a:prstGeom prst="rect">
             <a:avLst/>
@@ -15368,7 +15377,7 @@
         <p:spPr>
           <a:xfrm>
             <a:off x="316800" y="305280"/>
-            <a:ext cx="7131240" cy="878400"/>
+            <a:ext cx="7130880" cy="878040"/>
           </a:xfrm>
           <a:prstGeom prst="rect">
             <a:avLst/>
@@ -15424,7 +15433,7 @@
         <p:spPr>
           <a:xfrm>
             <a:off x="8670600" y="6388200"/>
-            <a:ext cx="326160" cy="281520"/>
+            <a:ext cx="325800" cy="281160"/>
           </a:xfrm>
           <a:prstGeom prst="rect">
             <a:avLst/>
@@ -15466,7 +15475,7 @@
                 <a:tab algn="l" pos="0"/>
               </a:tabLst>
             </a:pPr>
-            <a:fld id="{84900971-8A76-4E67-9A4D-12FD04FEF970}" type="slidenum">
+            <a:fld id="{E6BFAB4C-D9F9-48FD-A995-96539FE1C10A}" type="slidenum">
               <a:rPr b="0" lang="en-US" sz="800" spc="-1" strike="noStrike">
                 <a:solidFill>
                   <a:srgbClr val="595959"/>
@@ -15528,7 +15537,7 @@
         <p:spPr>
           <a:xfrm>
             <a:off x="316800" y="305280"/>
-            <a:ext cx="8508240" cy="969480"/>
+            <a:ext cx="8507880" cy="969120"/>
           </a:xfrm>
           <a:prstGeom prst="rect">
             <a:avLst/>
@@ -15603,7 +15612,7 @@
         <p:spPr>
           <a:xfrm>
             <a:off x="316800" y="1452240"/>
-            <a:ext cx="8353080" cy="5304600"/>
+            <a:ext cx="8352720" cy="5304240"/>
           </a:xfrm>
           <a:prstGeom prst="rect">
             <a:avLst/>
@@ -15691,7 +15700,7 @@
                 <a:latin typeface="Arial"/>
                 <a:ea typeface="Arial"/>
               </a:rPr>
-              <a:t>run the program</a:t>
+              <a:t>Run the program</a:t>
             </a:r>
             <a:endParaRPr b="0" lang="en-GB" sz="2800" spc="-1" strike="noStrike">
               <a:solidFill>
@@ -15723,7 +15732,7 @@
                 <a:latin typeface="Arial"/>
                 <a:ea typeface="Arial"/>
               </a:rPr>
-              <a:t>study and change program</a:t>
+              <a:t>Study and change program</a:t>
             </a:r>
             <a:endParaRPr b="0" lang="en-GB" sz="2800" spc="-1" strike="noStrike">
               <a:solidFill>
@@ -15755,7 +15764,7 @@
                 <a:latin typeface="Arial"/>
                 <a:ea typeface="Arial"/>
               </a:rPr>
-              <a:t>redistribute program</a:t>
+              <a:t>Redistribute program</a:t>
             </a:r>
             <a:endParaRPr b="0" lang="en-GB" sz="2800" spc="-1" strike="noStrike">
               <a:solidFill>
@@ -15787,7 +15796,7 @@
                 <a:latin typeface="Arial"/>
                 <a:ea typeface="Arial"/>
               </a:rPr>
-              <a:t>distribute modified program</a:t>
+              <a:t>Distribute modified program</a:t>
             </a:r>
             <a:endParaRPr b="0" lang="en-GB" sz="2800" spc="-1" strike="noStrike">
               <a:solidFill>
@@ -15902,7 +15911,7 @@
         <p:spPr>
           <a:xfrm>
             <a:off x="2018880" y="6316200"/>
-            <a:ext cx="6421680" cy="540720"/>
+            <a:ext cx="6421320" cy="540360"/>
           </a:xfrm>
           <a:prstGeom prst="rect">
             <a:avLst/>
@@ -15983,7 +15992,7 @@
         <p:spPr>
           <a:xfrm>
             <a:off x="8670600" y="6388200"/>
-            <a:ext cx="326160" cy="281520"/>
+            <a:ext cx="325800" cy="281160"/>
           </a:xfrm>
           <a:prstGeom prst="rect">
             <a:avLst/>
@@ -16025,7 +16034,7 @@
                 <a:tab algn="l" pos="0"/>
               </a:tabLst>
             </a:pPr>
-            <a:fld id="{68655636-3450-4485-AC8E-2175464FCC3A}" type="slidenum">
+            <a:fld id="{CB64CF5F-82E9-440B-9E2A-2B434FD4F2AF}" type="slidenum">
               <a:rPr b="0" lang="en-US" sz="800" spc="-1" strike="noStrike">
                 <a:solidFill>
                   <a:srgbClr val="595959"/>
@@ -16057,7 +16066,7 @@
         <p:spPr>
           <a:xfrm>
             <a:off x="7634160" y="4963680"/>
-            <a:ext cx="841320" cy="996840"/>
+            <a:ext cx="840960" cy="996480"/>
           </a:xfrm>
           <a:prstGeom prst="rect">
             <a:avLst/>
@@ -16110,7 +16119,7 @@
         <p:spPr>
           <a:xfrm>
             <a:off x="316800" y="305280"/>
-            <a:ext cx="8508240" cy="969480"/>
+            <a:ext cx="8507880" cy="969120"/>
           </a:xfrm>
           <a:prstGeom prst="rect">
             <a:avLst/>
@@ -16186,7 +16195,7 @@
         <p:spPr>
           <a:xfrm>
             <a:off x="316800" y="1452240"/>
-            <a:ext cx="8353080" cy="4603320"/>
+            <a:ext cx="8352720" cy="4602960"/>
           </a:xfrm>
           <a:prstGeom prst="rect">
             <a:avLst/>
@@ -16357,7 +16366,7 @@
         <p:spPr>
           <a:xfrm>
             <a:off x="2018880" y="6055920"/>
-            <a:ext cx="6421680" cy="540720"/>
+            <a:ext cx="6421320" cy="540360"/>
           </a:xfrm>
           <a:prstGeom prst="rect">
             <a:avLst/>
@@ -16418,7 +16427,7 @@
         <p:spPr>
           <a:xfrm>
             <a:off x="8670600" y="6388200"/>
-            <a:ext cx="326160" cy="281520"/>
+            <a:ext cx="325800" cy="281160"/>
           </a:xfrm>
           <a:prstGeom prst="rect">
             <a:avLst/>
@@ -16460,7 +16469,7 @@
                 <a:tab algn="l" pos="0"/>
               </a:tabLst>
             </a:pPr>
-            <a:fld id="{5EEF19AC-AA94-45DD-BB93-AAFFF9FABF7F}" type="slidenum">
+            <a:fld id="{CD57C34E-546E-4B95-B087-873008E6CE74}" type="slidenum">
               <a:rPr b="0" lang="en-US" sz="800" spc="-1" strike="noStrike">
                 <a:solidFill>
                   <a:srgbClr val="595959"/>
@@ -16492,7 +16501,7 @@
         <p:spPr>
           <a:xfrm>
             <a:off x="5596200" y="3219480"/>
-            <a:ext cx="2666160" cy="2666160"/>
+            <a:ext cx="2665800" cy="2665800"/>
           </a:xfrm>
           <a:prstGeom prst="rect">
             <a:avLst/>
@@ -16545,7 +16554,7 @@
         <p:spPr>
           <a:xfrm>
             <a:off x="457200" y="879480"/>
-            <a:ext cx="8228520" cy="614880"/>
+            <a:ext cx="8228160" cy="614520"/>
           </a:xfrm>
           <a:prstGeom prst="rect">
             <a:avLst/>
@@ -16601,7 +16610,7 @@
         <p:spPr>
           <a:xfrm>
             <a:off x="457200" y="1679400"/>
-            <a:ext cx="8228520" cy="3901680"/>
+            <a:ext cx="8228160" cy="3901320"/>
           </a:xfrm>
           <a:prstGeom prst="rect">
             <a:avLst/>
@@ -16654,7 +16663,7 @@
                 <a:latin typeface="Arial"/>
                 <a:ea typeface="Arial"/>
               </a:rPr>
-              <a:t>Learn principles and success stories about the open source movement outside of open source software. </a:t>
+              <a:t>Learn principles and success stories about the open source movement outside of open source software </a:t>
             </a:r>
             <a:endParaRPr b="0" lang="en-GB" sz="2800" spc="-1" strike="noStrike">
               <a:solidFill>
@@ -16685,7 +16694,7 @@
                 <a:latin typeface="Arial"/>
                 <a:ea typeface="Arial"/>
               </a:rPr>
-              <a:t>Results can be significant, as they can improve the collaboration of the open source movement and specifically the software movement both technically and socially. </a:t>
+              <a:t>Results can be significant, as they can improve the collaboration of the open source movement and specifically the software movement both technically and socially </a:t>
             </a:r>
             <a:endParaRPr b="0" lang="en-GB" sz="2800" spc="-1" strike="noStrike">
               <a:solidFill>
@@ -16709,7 +16718,7 @@
         <p:spPr>
           <a:xfrm>
             <a:off x="8670600" y="6388200"/>
-            <a:ext cx="326160" cy="281520"/>
+            <a:ext cx="325800" cy="281160"/>
           </a:xfrm>
           <a:prstGeom prst="rect">
             <a:avLst/>
@@ -16751,7 +16760,7 @@
                 <a:tab algn="l" pos="0"/>
               </a:tabLst>
             </a:pPr>
-            <a:fld id="{B46FAE5B-12DE-4D63-A2C2-5270C427722B}" type="slidenum">
+            <a:fld id="{32DE6690-419C-4F2E-A4FB-BD22072F3F0A}" type="slidenum">
               <a:rPr b="0" lang="en-US" sz="800" spc="-1" strike="noStrike">
                 <a:solidFill>
                   <a:srgbClr val="595959"/>
@@ -16759,7 +16768,7 @@
                 <a:latin typeface="Arial"/>
                 <a:ea typeface="Arial"/>
               </a:rPr>
-              <a:t>5</a:t>
+              <a:t>&lt;number&gt;</a:t>
             </a:fld>
             <a:endParaRPr b="0" lang="en-GB" sz="800" spc="-1" strike="noStrike">
               <a:solidFill>
@@ -16813,7 +16822,7 @@
         <p:spPr>
           <a:xfrm>
             <a:off x="457200" y="1604520"/>
-            <a:ext cx="8228520" cy="3976560"/>
+            <a:ext cx="8228160" cy="3976200"/>
           </a:xfrm>
           <a:prstGeom prst="rect">
             <a:avLst/>
@@ -17092,7 +17101,7 @@
         <p:spPr>
           <a:xfrm>
             <a:off x="457200" y="273600"/>
-            <a:ext cx="8228520" cy="1144080"/>
+            <a:ext cx="8228160" cy="1143720"/>
           </a:xfrm>
           <a:prstGeom prst="rect">
             <a:avLst/>
@@ -17148,7 +17157,7 @@
         <p:spPr>
           <a:xfrm>
             <a:off x="8670600" y="6388200"/>
-            <a:ext cx="326160" cy="281520"/>
+            <a:ext cx="325800" cy="281160"/>
           </a:xfrm>
           <a:prstGeom prst="rect">
             <a:avLst/>
@@ -17190,7 +17199,7 @@
                 <a:tab algn="l" pos="0"/>
               </a:tabLst>
             </a:pPr>
-            <a:fld id="{5822FE5B-4EA5-4949-BD6C-AE25E9C35655}" type="slidenum">
+            <a:fld id="{D51F6535-7CD5-47C5-9D15-9876D217D955}" type="slidenum">
               <a:rPr b="0" lang="en-US" sz="800" spc="-1" strike="noStrike">
                 <a:solidFill>
                   <a:srgbClr val="595959"/>
@@ -17198,7 +17207,7 @@
                 <a:latin typeface="Arial"/>
                 <a:ea typeface="Arial"/>
               </a:rPr>
-              <a:t>5</a:t>
+              <a:t>&lt;number&gt;</a:t>
             </a:fld>
             <a:endParaRPr b="0" lang="en-GB" sz="800" spc="-1" strike="noStrike">
               <a:solidFill>
@@ -17252,7 +17261,7 @@
         <p:spPr>
           <a:xfrm>
             <a:off x="457200" y="1604520"/>
-            <a:ext cx="8228520" cy="3976560"/>
+            <a:ext cx="8228160" cy="3976200"/>
           </a:xfrm>
           <a:prstGeom prst="rect">
             <a:avLst/>
@@ -17497,7 +17506,7 @@
         <p:spPr>
           <a:xfrm>
             <a:off x="457200" y="273600"/>
-            <a:ext cx="8228520" cy="1144080"/>
+            <a:ext cx="8228160" cy="1143720"/>
           </a:xfrm>
           <a:prstGeom prst="rect">
             <a:avLst/>
@@ -17553,7 +17562,7 @@
         <p:spPr>
           <a:xfrm>
             <a:off x="8670600" y="6388200"/>
-            <a:ext cx="326160" cy="281520"/>
+            <a:ext cx="325800" cy="281160"/>
           </a:xfrm>
           <a:prstGeom prst="rect">
             <a:avLst/>
@@ -17595,7 +17604,7 @@
                 <a:tab algn="l" pos="0"/>
               </a:tabLst>
             </a:pPr>
-            <a:fld id="{F4842BB1-5381-40D5-8F60-A98B8F5A3E62}" type="slidenum">
+            <a:fld id="{B8F505CA-8312-4F42-8D20-134B507E781F}" type="slidenum">
               <a:rPr b="0" lang="en-US" sz="800" spc="-1" strike="noStrike">
                 <a:solidFill>
                   <a:srgbClr val="595959"/>
@@ -17603,7 +17612,7 @@
                 <a:latin typeface="Arial"/>
                 <a:ea typeface="Arial"/>
               </a:rPr>
-              <a:t>5</a:t>
+              <a:t>&lt;number&gt;</a:t>
             </a:fld>
             <a:endParaRPr b="0" lang="en-GB" sz="800" spc="-1" strike="noStrike">
               <a:solidFill>
@@ -17657,7 +17666,7 @@
         <p:spPr>
           <a:xfrm>
             <a:off x="457200" y="1604520"/>
-            <a:ext cx="8569440" cy="4605120"/>
+            <a:ext cx="8569080" cy="4604760"/>
           </a:xfrm>
           <a:prstGeom prst="rect">
             <a:avLst/>
@@ -17977,7 +17986,7 @@
         <p:spPr>
           <a:xfrm>
             <a:off x="457200" y="203760"/>
-            <a:ext cx="8228520" cy="1144080"/>
+            <a:ext cx="8228160" cy="1143720"/>
           </a:xfrm>
           <a:prstGeom prst="rect">
             <a:avLst/>
@@ -18033,7 +18042,7 @@
         <p:spPr>
           <a:xfrm>
             <a:off x="8670600" y="6388200"/>
-            <a:ext cx="326160" cy="281520"/>
+            <a:ext cx="325800" cy="281160"/>
           </a:xfrm>
           <a:prstGeom prst="rect">
             <a:avLst/>
@@ -18075,7 +18084,7 @@
                 <a:tab algn="l" pos="0"/>
               </a:tabLst>
             </a:pPr>
-            <a:fld id="{E09B2BA0-A1AC-4412-90B2-1F3B8CAA3C0E}" type="slidenum">
+            <a:fld id="{1C563575-3782-4A28-9563-8F1E3646EBD0}" type="slidenum">
               <a:rPr b="0" lang="en-US" sz="800" spc="-1" strike="noStrike">
                 <a:solidFill>
                   <a:srgbClr val="595959"/>
@@ -18083,7 +18092,7 @@
                 <a:latin typeface="Arial"/>
                 <a:ea typeface="Arial"/>
               </a:rPr>
-              <a:t>5</a:t>
+              <a:t>&lt;number&gt;</a:t>
             </a:fld>
             <a:endParaRPr b="0" lang="en-GB" sz="800" spc="-1" strike="noStrike">
               <a:solidFill>
@@ -18137,7 +18146,7 @@
         <p:spPr>
           <a:xfrm>
             <a:off x="538920" y="215280"/>
-            <a:ext cx="8228520" cy="1144080"/>
+            <a:ext cx="8228160" cy="1143720"/>
           </a:xfrm>
           <a:prstGeom prst="rect">
             <a:avLst/>
@@ -18193,7 +18202,7 @@
         <p:spPr>
           <a:xfrm>
             <a:off x="8670600" y="6388200"/>
-            <a:ext cx="326160" cy="281520"/>
+            <a:ext cx="325800" cy="281160"/>
           </a:xfrm>
           <a:prstGeom prst="rect">
             <a:avLst/>
@@ -18235,7 +18244,7 @@
                 <a:tab algn="l" pos="0"/>
               </a:tabLst>
             </a:pPr>
-            <a:fld id="{90B9AE43-76DD-4989-9101-C12714AE0576}" type="slidenum">
+            <a:fld id="{46E08B8E-82B9-4863-9943-C664B0E9F9A3}" type="slidenum">
               <a:rPr b="0" lang="en-US" sz="800" spc="-1" strike="noStrike">
                 <a:solidFill>
                   <a:srgbClr val="595959"/>
@@ -18243,7 +18252,7 @@
                 <a:latin typeface="Arial"/>
                 <a:ea typeface="Arial"/>
               </a:rPr>
-              <a:t>5</a:t>
+              <a:t>&lt;number&gt;</a:t>
             </a:fld>
             <a:endParaRPr b="0" lang="en-GB" sz="800" spc="-1" strike="noStrike">
               <a:solidFill>
@@ -18263,7 +18272,7 @@
         <p:spPr>
           <a:xfrm>
             <a:off x="779400" y="2148840"/>
-            <a:ext cx="1936440" cy="1045800"/>
+            <a:ext cx="1936080" cy="1045440"/>
           </a:xfrm>
           <a:prstGeom prst="roundRect">
             <a:avLst>
@@ -18318,7 +18327,7 @@
         <p:spPr>
           <a:xfrm>
             <a:off x="862560" y="2210040"/>
-            <a:ext cx="1769760" cy="923400"/>
+            <a:ext cx="1769400" cy="923040"/>
           </a:xfrm>
           <a:prstGeom prst="roundRect">
             <a:avLst>
@@ -18382,7 +18391,7 @@
         <p:spPr>
           <a:xfrm>
             <a:off x="3340080" y="2148840"/>
-            <a:ext cx="1936440" cy="1045800"/>
+            <a:ext cx="1936080" cy="1045440"/>
           </a:xfrm>
           <a:prstGeom prst="roundRect">
             <a:avLst>
@@ -18437,7 +18446,7 @@
         <p:spPr>
           <a:xfrm>
             <a:off x="3423240" y="2210040"/>
-            <a:ext cx="1769760" cy="923400"/>
+            <a:ext cx="1769400" cy="923040"/>
           </a:xfrm>
           <a:prstGeom prst="roundRect">
             <a:avLst>
@@ -18501,7 +18510,7 @@
         <p:spPr>
           <a:xfrm>
             <a:off x="5900400" y="2210040"/>
-            <a:ext cx="1936440" cy="1045800"/>
+            <a:ext cx="1936080" cy="1045440"/>
           </a:xfrm>
           <a:prstGeom prst="roundRect">
             <a:avLst>
@@ -18556,7 +18565,7 @@
         <p:spPr>
           <a:xfrm>
             <a:off x="5983920" y="2271240"/>
-            <a:ext cx="1769760" cy="923400"/>
+            <a:ext cx="1769400" cy="923040"/>
           </a:xfrm>
           <a:prstGeom prst="roundRect">
             <a:avLst>
@@ -18620,7 +18629,7 @@
         <p:spPr>
           <a:xfrm>
             <a:off x="779400" y="3942000"/>
-            <a:ext cx="1936440" cy="1045800"/>
+            <a:ext cx="1936080" cy="1045440"/>
           </a:xfrm>
           <a:prstGeom prst="roundRect">
             <a:avLst>
@@ -18675,7 +18684,7 @@
         <p:spPr>
           <a:xfrm>
             <a:off x="862560" y="4003200"/>
-            <a:ext cx="1769760" cy="923400"/>
+            <a:ext cx="1769400" cy="923040"/>
           </a:xfrm>
           <a:prstGeom prst="roundRect">
             <a:avLst>
@@ -18749,7 +18758,7 @@
         <p:spPr>
           <a:xfrm>
             <a:off x="3340080" y="3942000"/>
-            <a:ext cx="1936440" cy="1045800"/>
+            <a:ext cx="1936080" cy="1045440"/>
           </a:xfrm>
           <a:prstGeom prst="roundRect">
             <a:avLst>
@@ -18804,7 +18813,7 @@
         <p:spPr>
           <a:xfrm>
             <a:off x="3423240" y="4003200"/>
-            <a:ext cx="1769760" cy="923400"/>
+            <a:ext cx="1769400" cy="923040"/>
           </a:xfrm>
           <a:prstGeom prst="roundRect">
             <a:avLst>
@@ -18868,7 +18877,7 @@
         <p:spPr>
           <a:xfrm>
             <a:off x="5900400" y="3942000"/>
-            <a:ext cx="1936440" cy="1045800"/>
+            <a:ext cx="1936080" cy="1045440"/>
           </a:xfrm>
           <a:prstGeom prst="roundRect">
             <a:avLst>
@@ -18923,7 +18932,7 @@
         <p:spPr>
           <a:xfrm>
             <a:off x="5983920" y="4003200"/>
-            <a:ext cx="1769760" cy="923400"/>
+            <a:ext cx="1769400" cy="923040"/>
           </a:xfrm>
           <a:prstGeom prst="roundRect">
             <a:avLst>
@@ -18989,8 +18998,8 @@
         </p:nvCxnSpPr>
         <p:spPr>
           <a:xfrm>
-            <a:off x="1747440" y="3133440"/>
-            <a:ext cx="360" cy="870120"/>
+            <a:off x="1747080" y="3133080"/>
+            <a:ext cx="360" cy="870480"/>
           </a:xfrm>
           <a:prstGeom prst="straightConnector1">
             <a:avLst/>
@@ -19015,8 +19024,8 @@
         </p:nvCxnSpPr>
         <p:spPr>
           <a:xfrm flipV="1">
-            <a:off x="2632320" y="3133440"/>
-            <a:ext cx="1676160" cy="1331640"/>
+            <a:off x="2631960" y="3133080"/>
+            <a:ext cx="1676160" cy="1332000"/>
           </a:xfrm>
           <a:prstGeom prst="straightConnector1">
             <a:avLst/>
@@ -19041,8 +19050,8 @@
         </p:nvCxnSpPr>
         <p:spPr>
           <a:xfrm>
-            <a:off x="4308120" y="3133440"/>
-            <a:ext cx="360" cy="870120"/>
+            <a:off x="4307760" y="3133080"/>
+            <a:ext cx="360" cy="870480"/>
           </a:xfrm>
           <a:prstGeom prst="straightConnector1">
             <a:avLst/>
@@ -19067,8 +19076,8 @@
         </p:nvCxnSpPr>
         <p:spPr>
           <a:xfrm flipV="1">
-            <a:off x="5193000" y="3194640"/>
-            <a:ext cx="1676160" cy="1270440"/>
+            <a:off x="5192640" y="3194280"/>
+            <a:ext cx="1676160" cy="1270800"/>
           </a:xfrm>
           <a:prstGeom prst="straightConnector1">
             <a:avLst/>
@@ -19093,8 +19102,8 @@
         </p:nvCxnSpPr>
         <p:spPr>
           <a:xfrm>
-            <a:off x="6868800" y="3194640"/>
-            <a:ext cx="360" cy="808920"/>
+            <a:off x="6868440" y="3194280"/>
+            <a:ext cx="360" cy="809280"/>
           </a:xfrm>
           <a:prstGeom prst="straightConnector1">
             <a:avLst/>
@@ -19116,8 +19125,8 @@
         </p:nvSpPr>
         <p:spPr>
           <a:xfrm rot="16200000">
-            <a:off x="5360400" y="640440"/>
-            <a:ext cx="545040" cy="2471040"/>
+            <a:off x="5360400" y="640800"/>
+            <a:ext cx="544680" cy="2470680"/>
           </a:xfrm>
           <a:prstGeom prst="rightBrace">
             <a:avLst>
@@ -19171,7 +19180,7 @@
         <p:spPr>
           <a:xfrm>
             <a:off x="4587120" y="1202760"/>
-            <a:ext cx="2999160" cy="395640"/>
+            <a:ext cx="2998800" cy="395640"/>
           </a:xfrm>
           <a:prstGeom prst="rect">
             <a:avLst/>

</xml_diff>